<commit_message>
Update Prototype screen designs.pptx
</commit_message>
<xml_diff>
--- a/Prototype screen designs.pptx
+++ b/Prototype screen designs.pptx
@@ -112,6 +112,11 @@
       </a:defRPr>
     </a:lvl9pPr>
   </p:defaultTextStyle>
+  <p:extLst>
+    <p:ext uri="{EFAFB233-063F-42B5-8137-9DF3F51BA10A}">
+      <p15:sldGuideLst xmlns:p15="http://schemas.microsoft.com/office/powerpoint/2012/main"/>
+    </p:ext>
+  </p:extLst>
 </p:presentation>
 </file>
 
@@ -3345,7 +3350,12 @@
             <p:ph type="ctrTitle"/>
           </p:nvPr>
         </p:nvSpPr>
-        <p:spPr/>
+        <p:spPr>
+          <a:xfrm>
+            <a:off x="1524000" y="0"/>
+            <a:ext cx="9144000" cy="2387600"/>
+          </a:xfrm>
+        </p:spPr>
         <p:txBody>
           <a:bodyPr/>
           <a:lstStyle/>
@@ -3373,7 +3383,12 @@
             <p:ph type="subTitle" idx="1"/>
           </p:nvPr>
         </p:nvSpPr>
-        <p:spPr/>
+        <p:spPr>
+          <a:xfrm>
+            <a:off x="1524000" y="3007678"/>
+            <a:ext cx="9144000" cy="1655762"/>
+          </a:xfrm>
+        </p:spPr>
         <p:txBody>
           <a:bodyPr>
             <a:normAutofit/>
@@ -3826,10 +3841,10 @@
       </p:sp>
       <p:pic>
         <p:nvPicPr>
-          <p:cNvPr id="27" name="Content Placeholder 26">
-            <a:extLst>
-              <a:ext uri="{FF2B5EF4-FFF2-40B4-BE49-F238E27FC236}">
-                <a16:creationId xmlns:a16="http://schemas.microsoft.com/office/drawing/2014/main" id="{FE2EDF0F-7F93-49CF-9EF1-E2F30A735581}"/>
+          <p:cNvPr id="6" name="Content Placeholder 5">
+            <a:extLst>
+              <a:ext uri="{FF2B5EF4-FFF2-40B4-BE49-F238E27FC236}">
+                <a16:creationId xmlns:a16="http://schemas.microsoft.com/office/drawing/2014/main" id="{152A3869-D30B-4EEB-B720-C6BF913A8310}"/>
               </a:ext>
             </a:extLst>
           </p:cNvPr>
@@ -3854,8 +3869,8 @@
         </p:blipFill>
         <p:spPr>
           <a:xfrm>
-            <a:off x="1070468" y="683418"/>
-            <a:ext cx="9762068" cy="5491163"/>
+            <a:off x="1536192" y="1436402"/>
+            <a:ext cx="8427664" cy="4740561"/>
           </a:xfrm>
         </p:spPr>
       </p:pic>
@@ -3924,10 +3939,10 @@
       </p:sp>
       <p:pic>
         <p:nvPicPr>
-          <p:cNvPr id="5" name="Content Placeholder 4">
-            <a:extLst>
-              <a:ext uri="{FF2B5EF4-FFF2-40B4-BE49-F238E27FC236}">
-                <a16:creationId xmlns:a16="http://schemas.microsoft.com/office/drawing/2014/main" id="{044F8CDA-C9EB-4297-9E6A-B5BB771359A0}"/>
+          <p:cNvPr id="7" name="Content Placeholder 6">
+            <a:extLst>
+              <a:ext uri="{FF2B5EF4-FFF2-40B4-BE49-F238E27FC236}">
+                <a16:creationId xmlns:a16="http://schemas.microsoft.com/office/drawing/2014/main" id="{A5EAAA86-8B9E-44A5-85DC-E578C6B8A003}"/>
               </a:ext>
             </a:extLst>
           </p:cNvPr>
@@ -3952,8 +3967,8 @@
         </p:blipFill>
         <p:spPr>
           <a:xfrm>
-            <a:off x="1197864" y="886016"/>
-            <a:ext cx="9927280" cy="5584095"/>
+            <a:off x="2228144" y="1825625"/>
+            <a:ext cx="7735712" cy="4351338"/>
           </a:xfrm>
         </p:spPr>
       </p:pic>
@@ -4024,19 +4039,17 @@
       </p:sp>
       <p:pic>
         <p:nvPicPr>
-          <p:cNvPr id="5" name="Content Placeholder 4">
-            <a:extLst>
-              <a:ext uri="{FF2B5EF4-FFF2-40B4-BE49-F238E27FC236}">
-                <a16:creationId xmlns:a16="http://schemas.microsoft.com/office/drawing/2014/main" id="{F1E002E2-B300-4060-9BBB-CE8D80B60A19}"/>
+          <p:cNvPr id="8" name="Content Placeholder 6">
+            <a:extLst>
+              <a:ext uri="{FF2B5EF4-FFF2-40B4-BE49-F238E27FC236}">
+                <a16:creationId xmlns:a16="http://schemas.microsoft.com/office/drawing/2014/main" id="{D86093C8-703A-428A-9503-E9DC0E1E6632}"/>
               </a:ext>
             </a:extLst>
           </p:cNvPr>
           <p:cNvPicPr>
-            <a:picLocks noGrp="1" noChangeAspect="1"/>
+            <a:picLocks noChangeAspect="1"/>
           </p:cNvPicPr>
-          <p:nvPr>
-            <p:ph idx="1"/>
-          </p:nvPr>
+          <p:nvPr/>
         </p:nvPicPr>
         <p:blipFill>
           <a:blip r:embed="rId2">
@@ -4052,9 +4065,12 @@
         </p:blipFill>
         <p:spPr>
           <a:xfrm>
-            <a:off x="1161288" y="477934"/>
-            <a:ext cx="10480772" cy="5895434"/>
-          </a:xfrm>
+            <a:off x="1781215" y="1542161"/>
+            <a:ext cx="7735712" cy="4351338"/>
+          </a:xfrm>
+          <a:prstGeom prst="rect">
+            <a:avLst/>
+          </a:prstGeom>
         </p:spPr>
       </p:pic>
     </p:spTree>
@@ -4124,10 +4140,10 @@
       </p:sp>
       <p:pic>
         <p:nvPicPr>
-          <p:cNvPr id="5" name="Content Placeholder 4">
-            <a:extLst>
-              <a:ext uri="{FF2B5EF4-FFF2-40B4-BE49-F238E27FC236}">
-                <a16:creationId xmlns:a16="http://schemas.microsoft.com/office/drawing/2014/main" id="{601AEBAE-C1E7-43FA-832A-F1B430E95639}"/>
+          <p:cNvPr id="7" name="Content Placeholder 6">
+            <a:extLst>
+              <a:ext uri="{FF2B5EF4-FFF2-40B4-BE49-F238E27FC236}">
+                <a16:creationId xmlns:a16="http://schemas.microsoft.com/office/drawing/2014/main" id="{43A6E614-7605-4C9F-BE19-E6A6BF7BB737}"/>
               </a:ext>
             </a:extLst>
           </p:cNvPr>
@@ -4152,11 +4168,65 @@
         </p:blipFill>
         <p:spPr>
           <a:xfrm>
-            <a:off x="1033272" y="687578"/>
-            <a:ext cx="10320528" cy="5805297"/>
+            <a:off x="1188380" y="780002"/>
+            <a:ext cx="9711268" cy="5462588"/>
           </a:xfrm>
         </p:spPr>
       </p:pic>
+      <p:sp>
+        <p:nvSpPr>
+          <p:cNvPr id="8" name="Rectangle 7">
+            <a:extLst>
+              <a:ext uri="{FF2B5EF4-FFF2-40B4-BE49-F238E27FC236}">
+                <a16:creationId xmlns:a16="http://schemas.microsoft.com/office/drawing/2014/main" id="{23EBC88F-6F72-4324-A5CC-9E7B6F585DCA}"/>
+              </a:ext>
+            </a:extLst>
+          </p:cNvPr>
+          <p:cNvSpPr/>
+          <p:nvPr/>
+        </p:nvSpPr>
+        <p:spPr>
+          <a:xfrm>
+            <a:off x="9793224" y="2873978"/>
+            <a:ext cx="822960" cy="1067086"/>
+          </a:xfrm>
+          <a:prstGeom prst="rect">
+            <a:avLst/>
+          </a:prstGeom>
+          <a:noFill/>
+          <a:ln w="9525" cap="flat" cmpd="sng" algn="ctr">
+            <a:solidFill>
+              <a:schemeClr val="accent2"/>
+            </a:solidFill>
+            <a:prstDash val="solid"/>
+            <a:round/>
+            <a:headEnd type="none" w="med" len="med"/>
+            <a:tailEnd type="none" w="med" len="med"/>
+          </a:ln>
+        </p:spPr>
+        <p:style>
+          <a:lnRef idx="0">
+            <a:scrgbClr r="0" g="0" b="0"/>
+          </a:lnRef>
+          <a:fillRef idx="0">
+            <a:scrgbClr r="0" g="0" b="0"/>
+          </a:fillRef>
+          <a:effectRef idx="0">
+            <a:scrgbClr r="0" g="0" b="0"/>
+          </a:effectRef>
+          <a:fontRef idx="minor">
+            <a:schemeClr val="accent2"/>
+          </a:fontRef>
+        </p:style>
+        <p:txBody>
+          <a:bodyPr rtlCol="0" anchor="ctr"/>
+          <a:lstStyle/>
+          <a:p>
+            <a:pPr algn="ctr"/>
+            <a:endParaRPr lang="en-US"/>
+          </a:p>
+        </p:txBody>
+      </p:sp>
     </p:spTree>
     <p:extLst>
       <p:ext uri="{BB962C8B-B14F-4D97-AF65-F5344CB8AC3E}">
@@ -4224,10 +4294,10 @@
       </p:sp>
       <p:pic>
         <p:nvPicPr>
-          <p:cNvPr id="5" name="Content Placeholder 4">
-            <a:extLst>
-              <a:ext uri="{FF2B5EF4-FFF2-40B4-BE49-F238E27FC236}">
-                <a16:creationId xmlns:a16="http://schemas.microsoft.com/office/drawing/2014/main" id="{9BBBBDD1-4587-4940-94F5-91937D1CDB7F}"/>
+          <p:cNvPr id="15" name="Content Placeholder 14">
+            <a:extLst>
+              <a:ext uri="{FF2B5EF4-FFF2-40B4-BE49-F238E27FC236}">
+                <a16:creationId xmlns:a16="http://schemas.microsoft.com/office/drawing/2014/main" id="{9A0DC641-02C8-40C7-BAD4-45E1EDEF7793}"/>
               </a:ext>
             </a:extLst>
           </p:cNvPr>
@@ -4252,8 +4322,8 @@
         </p:blipFill>
         <p:spPr>
           <a:xfrm>
-            <a:off x="950976" y="1027906"/>
-            <a:ext cx="9570664" cy="5383499"/>
+            <a:off x="1773936" y="856268"/>
+            <a:ext cx="9459016" cy="5320696"/>
           </a:xfrm>
         </p:spPr>
       </p:pic>
@@ -4324,10 +4394,10 @@
       </p:sp>
       <p:pic>
         <p:nvPicPr>
-          <p:cNvPr id="5" name="Content Placeholder 4">
-            <a:extLst>
-              <a:ext uri="{FF2B5EF4-FFF2-40B4-BE49-F238E27FC236}">
-                <a16:creationId xmlns:a16="http://schemas.microsoft.com/office/drawing/2014/main" id="{B4BB18E4-EAB2-43D2-9DAB-83F2D2508683}"/>
+          <p:cNvPr id="7" name="Content Placeholder 6">
+            <a:extLst>
+              <a:ext uri="{FF2B5EF4-FFF2-40B4-BE49-F238E27FC236}">
+                <a16:creationId xmlns:a16="http://schemas.microsoft.com/office/drawing/2014/main" id="{1DA6C88D-4159-4823-A926-A5272B6E3587}"/>
               </a:ext>
             </a:extLst>
           </p:cNvPr>
@@ -4352,11 +4422,110 @@
         </p:blipFill>
         <p:spPr>
           <a:xfrm>
-            <a:off x="937938" y="874935"/>
-            <a:ext cx="9987450" cy="5617940"/>
+            <a:off x="1051560" y="1044924"/>
+            <a:ext cx="9058600" cy="5095463"/>
           </a:xfrm>
         </p:spPr>
       </p:pic>
+      <p:sp>
+        <p:nvSpPr>
+          <p:cNvPr id="8" name="Oval 7">
+            <a:extLst>
+              <a:ext uri="{FF2B5EF4-FFF2-40B4-BE49-F238E27FC236}">
+                <a16:creationId xmlns:a16="http://schemas.microsoft.com/office/drawing/2014/main" id="{B7F9C951-B183-4312-B0C2-6621C9375E2C}"/>
+              </a:ext>
+            </a:extLst>
+          </p:cNvPr>
+          <p:cNvSpPr/>
+          <p:nvPr/>
+        </p:nvSpPr>
+        <p:spPr>
+          <a:xfrm>
+            <a:off x="9482328" y="2905284"/>
+            <a:ext cx="320040" cy="274320"/>
+          </a:xfrm>
+          <a:prstGeom prst="ellipse">
+            <a:avLst/>
+          </a:prstGeom>
+          <a:noFill/>
+          <a:ln w="38100" cap="flat" cmpd="sng" algn="ctr">
+            <a:solidFill>
+              <a:srgbClr val="FF0000"/>
+            </a:solidFill>
+            <a:prstDash val="solid"/>
+            <a:round/>
+            <a:headEnd type="none" w="med" len="med"/>
+            <a:tailEnd type="none" w="med" len="med"/>
+          </a:ln>
+        </p:spPr>
+        <p:style>
+          <a:lnRef idx="0">
+            <a:scrgbClr r="0" g="0" b="0"/>
+          </a:lnRef>
+          <a:fillRef idx="0">
+            <a:scrgbClr r="0" g="0" b="0"/>
+          </a:fillRef>
+          <a:effectRef idx="0">
+            <a:scrgbClr r="0" g="0" b="0"/>
+          </a:effectRef>
+          <a:fontRef idx="minor">
+            <a:schemeClr val="accent2"/>
+          </a:fontRef>
+        </p:style>
+        <p:txBody>
+          <a:bodyPr rtlCol="0" anchor="ctr"/>
+          <a:lstStyle/>
+          <a:p>
+            <a:pPr algn="ctr"/>
+            <a:endParaRPr lang="en-US"/>
+          </a:p>
+        </p:txBody>
+      </p:sp>
+      <p:cxnSp>
+        <p:nvCxnSpPr>
+          <p:cNvPr id="10" name="Straight Arrow Connector 9">
+            <a:extLst>
+              <a:ext uri="{FF2B5EF4-FFF2-40B4-BE49-F238E27FC236}">
+                <a16:creationId xmlns:a16="http://schemas.microsoft.com/office/drawing/2014/main" id="{7E93EEE1-5377-497C-B74F-3918C6495FEF}"/>
+              </a:ext>
+            </a:extLst>
+          </p:cNvPr>
+          <p:cNvCxnSpPr/>
+          <p:nvPr/>
+        </p:nvCxnSpPr>
+        <p:spPr>
+          <a:xfrm flipH="1">
+            <a:off x="6958584" y="3179604"/>
+            <a:ext cx="2432304" cy="606012"/>
+          </a:xfrm>
+          <a:prstGeom prst="straightConnector1">
+            <a:avLst/>
+          </a:prstGeom>
+          <a:ln w="38100">
+            <a:solidFill>
+              <a:schemeClr val="tx2">
+                <a:lumMod val="20000"/>
+                <a:lumOff val="80000"/>
+              </a:schemeClr>
+            </a:solidFill>
+            <a:tailEnd type="triangle"/>
+          </a:ln>
+        </p:spPr>
+        <p:style>
+          <a:lnRef idx="3">
+            <a:schemeClr val="accent2"/>
+          </a:lnRef>
+          <a:fillRef idx="0">
+            <a:schemeClr val="accent2"/>
+          </a:fillRef>
+          <a:effectRef idx="2">
+            <a:schemeClr val="accent2"/>
+          </a:effectRef>
+          <a:fontRef idx="minor">
+            <a:schemeClr val="tx1"/>
+          </a:fontRef>
+        </p:style>
+      </p:cxnSp>
     </p:spTree>
     <p:extLst>
       <p:ext uri="{BB962C8B-B14F-4D97-AF65-F5344CB8AC3E}">
@@ -4403,7 +4572,12 @@
             <p:ph type="title"/>
           </p:nvPr>
         </p:nvSpPr>
-        <p:spPr/>
+        <p:spPr>
+          <a:xfrm>
+            <a:off x="856148" y="-92075"/>
+            <a:ext cx="10515600" cy="1325563"/>
+          </a:xfrm>
+        </p:spPr>
         <p:txBody>
           <a:bodyPr/>
           <a:lstStyle/>
@@ -4415,28 +4589,92 @@
           </a:p>
         </p:txBody>
       </p:sp>
-      <p:sp>
-        <p:nvSpPr>
-          <p:cNvPr id="7" name="Content Placeholder 6">
-            <a:extLst>
-              <a:ext uri="{FF2B5EF4-FFF2-40B4-BE49-F238E27FC236}">
-                <a16:creationId xmlns:a16="http://schemas.microsoft.com/office/drawing/2014/main" id="{762FF08F-F94C-4C78-BE11-350A3C1940A8}"/>
-              </a:ext>
-            </a:extLst>
-          </p:cNvPr>
-          <p:cNvSpPr>
-            <a:spLocks noGrp="1"/>
-          </p:cNvSpPr>
+      <p:pic>
+        <p:nvPicPr>
+          <p:cNvPr id="4" name="Content Placeholder 3">
+            <a:extLst>
+              <a:ext uri="{FF2B5EF4-FFF2-40B4-BE49-F238E27FC236}">
+                <a16:creationId xmlns:a16="http://schemas.microsoft.com/office/drawing/2014/main" id="{C4E92929-0045-4FE1-A5BA-0F88B66BC86E}"/>
+              </a:ext>
+            </a:extLst>
+          </p:cNvPr>
+          <p:cNvPicPr>
+            <a:picLocks noGrp="1" noChangeAspect="1"/>
+          </p:cNvPicPr>
           <p:nvPr>
             <p:ph idx="1"/>
           </p:nvPr>
-        </p:nvSpPr>
-        <p:spPr/>
-        <p:txBody>
-          <a:bodyPr/>
-          <a:lstStyle/>
-          <a:p>
-            <a:endParaRPr lang="en-US" dirty="0"/>
+        </p:nvPicPr>
+        <p:blipFill>
+          <a:blip r:embed="rId2">
+            <a:extLst>
+              <a:ext uri="{28A0092B-C50C-407E-A947-70E740481C1C}">
+                <a14:useLocalDpi xmlns:a14="http://schemas.microsoft.com/office/drawing/2010/main" val="0"/>
+              </a:ext>
+            </a:extLst>
+          </a:blip>
+          <a:stretch>
+            <a:fillRect/>
+          </a:stretch>
+        </p:blipFill>
+        <p:spPr>
+          <a:xfrm>
+            <a:off x="1627292" y="982472"/>
+            <a:ext cx="9973396" cy="5610035"/>
+          </a:xfrm>
+        </p:spPr>
+      </p:pic>
+      <p:sp>
+        <p:nvSpPr>
+          <p:cNvPr id="5" name="Rectangle: Rounded Corners 4">
+            <a:extLst>
+              <a:ext uri="{FF2B5EF4-FFF2-40B4-BE49-F238E27FC236}">
+                <a16:creationId xmlns:a16="http://schemas.microsoft.com/office/drawing/2014/main" id="{B2679DDA-59E7-470A-AC28-963234DC14CE}"/>
+              </a:ext>
+            </a:extLst>
+          </p:cNvPr>
+          <p:cNvSpPr/>
+          <p:nvPr/>
+        </p:nvSpPr>
+        <p:spPr>
+          <a:xfrm>
+            <a:off x="8906256" y="2295144"/>
+            <a:ext cx="2816352" cy="1033272"/>
+          </a:xfrm>
+          <a:prstGeom prst="roundRect">
+            <a:avLst/>
+          </a:prstGeom>
+          <a:noFill/>
+          <a:ln w="9525" cap="flat" cmpd="sng" algn="ctr">
+            <a:solidFill>
+              <a:schemeClr val="accent2"/>
+            </a:solidFill>
+            <a:prstDash val="solid"/>
+            <a:round/>
+            <a:headEnd type="none" w="med" len="med"/>
+            <a:tailEnd type="none" w="med" len="med"/>
+          </a:ln>
+        </p:spPr>
+        <p:style>
+          <a:lnRef idx="0">
+            <a:scrgbClr r="0" g="0" b="0"/>
+          </a:lnRef>
+          <a:fillRef idx="0">
+            <a:scrgbClr r="0" g="0" b="0"/>
+          </a:fillRef>
+          <a:effectRef idx="0">
+            <a:scrgbClr r="0" g="0" b="0"/>
+          </a:effectRef>
+          <a:fontRef idx="minor">
+            <a:schemeClr val="accent2"/>
+          </a:fontRef>
+        </p:style>
+        <p:txBody>
+          <a:bodyPr rtlCol="0" anchor="ctr"/>
+          <a:lstStyle/>
+          <a:p>
+            <a:pPr algn="ctr"/>
+            <a:endParaRPr lang="en-US"/>
           </a:p>
         </p:txBody>
       </p:sp>

</xml_diff>